<commit_message>
added document for CS2 task 1, naming of the titles adapted
</commit_message>
<xml_diff>
--- a/ch.bfh.bti7081.s2013.black/doc/taskRepository/CS1/CS1 Task 1.pptx
+++ b/ch.bfh.bti7081.s2013.black/doc/taskRepository/CS1/CS1 Task 1.pptx
@@ -492,7 +492,7 @@
             <a:fld id="{58FB4290-6522-4139-852E-05BD9E7F0D2E}" type="datetime1">
               <a:rPr lang="en-US" smtClean="0"/>
               <a:pPr/>
-              <a:t>3/1/2013</a:t>
+              <a:t>3/13/2013</a:t>
             </a:fld>
             <a:endParaRPr lang="en-US"/>
           </a:p>
@@ -684,7 +684,7 @@
             <a:fld id="{AAB955F9-81EA-47C5-8059-9E5C2B437C70}" type="datetime1">
               <a:rPr lang="en-US" smtClean="0"/>
               <a:pPr/>
-              <a:t>3/1/2013</a:t>
+              <a:t>3/13/2013</a:t>
             </a:fld>
             <a:endParaRPr lang="en-US"/>
           </a:p>
@@ -2725,7 +2725,7 @@
             <a:fld id="{327B613C-1AD7-49D3-885D-F654C5CDBAA6}" type="datetime1">
               <a:rPr lang="en-US" smtClean="0"/>
               <a:pPr/>
-              <a:t>3/1/2013</a:t>
+              <a:t>3/13/2013</a:t>
             </a:fld>
             <a:endParaRPr lang="en-US" dirty="0"/>
           </a:p>
@@ -3076,7 +3076,7 @@
           <p:nvPr userDrawn="1"/>
         </p:nvPicPr>
         <p:blipFill>
-          <a:blip r:embed="rId13"/>
+          <a:blip r:embed="rId13" cstate="print"/>
           <a:srcRect/>
           <a:stretch>
             <a:fillRect/>
@@ -3505,12 +3505,16 @@
           <a:lstStyle/>
           <a:p>
             <a:r>
-              <a:rPr lang="en-GB" noProof="0" dirty="0" smtClean="0"/>
-              <a:t>CS</a:t>
+              <a:rPr lang="en-GB" noProof="0" smtClean="0"/>
+              <a:t>CS1</a:t>
+            </a:r>
+            <a:r>
+              <a:rPr lang="en-GB" baseline="0" noProof="0" smtClean="0"/>
+              <a:t> </a:t>
             </a:r>
             <a:r>
               <a:rPr lang="en-GB" baseline="0" noProof="0" dirty="0" smtClean="0"/>
-              <a:t> Task 1: First Analysis</a:t>
+              <a:t>Task 1: First Analysis</a:t>
             </a:r>
             <a:endParaRPr lang="en-GB" noProof="0" dirty="0"/>
           </a:p>
@@ -3562,7 +3566,7 @@
     </p:spTree>
     <p:extLst>
       <p:ext uri="{BB962C8B-B14F-4D97-AF65-F5344CB8AC3E}">
-        <p14:creationId xmlns:p14="http://schemas.microsoft.com/office/powerpoint/2010/main" val="898938549"/>
+        <p14:creationId xmlns:p14="http://schemas.microsoft.com/office/powerpoint/2010/main" xmlns="" val="898938549"/>
       </p:ext>
     </p:extLst>
   </p:cSld>
@@ -3708,10 +3712,10 @@
           <p:nvPr/>
         </p:nvPicPr>
         <p:blipFill>
-          <a:blip r:embed="rId2">
+          <a:blip r:embed="rId2" cstate="print">
             <a:extLst>
               <a:ext uri="{28A0092B-C50C-407E-A947-70E740481C1C}">
-                <a14:useLocalDpi xmlns:a14="http://schemas.microsoft.com/office/drawing/2010/main" val="0"/>
+                <a14:useLocalDpi xmlns:a14="http://schemas.microsoft.com/office/drawing/2010/main" xmlns="" val="0"/>
               </a:ext>
             </a:extLst>
           </a:blip>
@@ -3734,14 +3738,14 @@
           </a:ln>
           <a:extLst>
             <a:ext uri="{909E8E84-426E-40DD-AFC4-6F175D3DCCD1}">
-              <a14:hiddenFill xmlns:a14="http://schemas.microsoft.com/office/drawing/2010/main">
+              <a14:hiddenFill xmlns:a14="http://schemas.microsoft.com/office/drawing/2010/main" xmlns="">
                 <a:solidFill>
                   <a:schemeClr val="accent1"/>
                 </a:solidFill>
               </a14:hiddenFill>
             </a:ext>
             <a:ext uri="{91240B29-F687-4F45-9708-019B960494DF}">
-              <a14:hiddenLine xmlns:a14="http://schemas.microsoft.com/office/drawing/2010/main" w="9525">
+              <a14:hiddenLine xmlns:a14="http://schemas.microsoft.com/office/drawing/2010/main" xmlns="" w="9525">
                 <a:solidFill>
                   <a:schemeClr val="tx1"/>
                 </a:solidFill>
@@ -3756,7 +3760,7 @@
     </p:spTree>
     <p:extLst>
       <p:ext uri="{BB962C8B-B14F-4D97-AF65-F5344CB8AC3E}">
-        <p14:creationId xmlns:p14="http://schemas.microsoft.com/office/powerpoint/2010/main" val="3486983716"/>
+        <p14:creationId xmlns:p14="http://schemas.microsoft.com/office/powerpoint/2010/main" xmlns="" val="3486983716"/>
       </p:ext>
     </p:extLst>
   </p:cSld>
@@ -3946,7 +3950,7 @@
     </p:spTree>
     <p:extLst>
       <p:ext uri="{BB962C8B-B14F-4D97-AF65-F5344CB8AC3E}">
-        <p14:creationId xmlns:p14="http://schemas.microsoft.com/office/powerpoint/2010/main" val="762037836"/>
+        <p14:creationId xmlns:p14="http://schemas.microsoft.com/office/powerpoint/2010/main" xmlns="" val="762037836"/>
       </p:ext>
     </p:extLst>
   </p:cSld>
@@ -4142,7 +4146,7 @@
     </p:spTree>
     <p:extLst>
       <p:ext uri="{BB962C8B-B14F-4D97-AF65-F5344CB8AC3E}">
-        <p14:creationId xmlns:p14="http://schemas.microsoft.com/office/powerpoint/2010/main" val="1677081277"/>
+        <p14:creationId xmlns:p14="http://schemas.microsoft.com/office/powerpoint/2010/main" xmlns="" val="1677081277"/>
       </p:ext>
     </p:extLst>
   </p:cSld>
@@ -4331,7 +4335,7 @@
     </p:spTree>
     <p:extLst>
       <p:ext uri="{BB962C8B-B14F-4D97-AF65-F5344CB8AC3E}">
-        <p14:creationId xmlns:p14="http://schemas.microsoft.com/office/powerpoint/2010/main" val="3404555890"/>
+        <p14:creationId xmlns:p14="http://schemas.microsoft.com/office/powerpoint/2010/main" xmlns="" val="3404555890"/>
       </p:ext>
     </p:extLst>
   </p:cSld>
@@ -4561,7 +4565,7 @@
     </p:spTree>
     <p:extLst>
       <p:ext uri="{BB962C8B-B14F-4D97-AF65-F5344CB8AC3E}">
-        <p14:creationId xmlns:p14="http://schemas.microsoft.com/office/powerpoint/2010/main" val="1046131973"/>
+        <p14:creationId xmlns:p14="http://schemas.microsoft.com/office/powerpoint/2010/main" xmlns="" val="1046131973"/>
       </p:ext>
     </p:extLst>
   </p:cSld>

</xml_diff>